<commit_message>
draft slides for L 5 and 6
</commit_message>
<xml_diff>
--- a/fall2016/lectures/4-Ciphers.pptx
+++ b/fall2016/lectures/4-Ciphers.pptx
@@ -251,7 +251,7 @@
           <a:p>
             <a:fld id="{09CB2C89-668B-584F-89CD-93298C1F09F0}" type="datetimeFigureOut">
               <a:rPr lang="en-US" smtClean="0"/>
-              <a:t>9/26/16</a:t>
+              <a:t>9/27/16</a:t>
             </a:fld>
             <a:endParaRPr lang="en-US"/>
           </a:p>
@@ -416,7 +416,7 @@
           <a:p>
             <a:fld id="{9870131A-9846-7D42-9078-5836BA2067C9}" type="datetimeFigureOut">
               <a:rPr lang="en-US" smtClean="0"/>
-              <a:t>9/26/16</a:t>
+              <a:t>9/27/16</a:t>
             </a:fld>
             <a:endParaRPr lang="en-US"/>
           </a:p>
@@ -10022,7 +10022,7 @@
           <a:p>
             <a:fld id="{62B18FAC-345F-B040-9DF7-375FB57F8B48}" type="datetimeFigureOut">
               <a:rPr lang="en-US" smtClean="0"/>
-              <a:t>9/26/16</a:t>
+              <a:t>9/27/16</a:t>
             </a:fld>
             <a:endParaRPr lang="en-US"/>
           </a:p>
@@ -10192,7 +10192,7 @@
           <a:p>
             <a:fld id="{62B18FAC-345F-B040-9DF7-375FB57F8B48}" type="datetimeFigureOut">
               <a:rPr lang="en-US" smtClean="0"/>
-              <a:t>9/26/16</a:t>
+              <a:t>9/27/16</a:t>
             </a:fld>
             <a:endParaRPr lang="en-US"/>
           </a:p>
@@ -10372,7 +10372,7 @@
           <a:p>
             <a:fld id="{62B18FAC-345F-B040-9DF7-375FB57F8B48}" type="datetimeFigureOut">
               <a:rPr lang="en-US" smtClean="0"/>
-              <a:t>9/26/16</a:t>
+              <a:t>9/27/16</a:t>
             </a:fld>
             <a:endParaRPr lang="en-US"/>
           </a:p>
@@ -10548,7 +10548,7 @@
             <a:fld id="{446FEFB0-7A1A-44E6-B9DF-D284AB76E538}" type="datetimeFigureOut">
               <a:rPr lang="en-US" smtClean="0"/>
               <a:pPr/>
-              <a:t>9/26/16</a:t>
+              <a:t>9/27/16</a:t>
             </a:fld>
             <a:endParaRPr lang="en-US"/>
           </a:p>
@@ -10732,7 +10732,7 @@
             <a:fld id="{446FEFB0-7A1A-44E6-B9DF-D284AB76E538}" type="datetimeFigureOut">
               <a:rPr lang="en-US" smtClean="0"/>
               <a:pPr/>
-              <a:t>9/26/16</a:t>
+              <a:t>9/27/16</a:t>
             </a:fld>
             <a:endParaRPr lang="en-US"/>
           </a:p>
@@ -10916,7 +10916,7 @@
             <a:fld id="{446FEFB0-7A1A-44E6-B9DF-D284AB76E538}" type="datetimeFigureOut">
               <a:rPr lang="en-US" smtClean="0"/>
               <a:pPr/>
-              <a:t>9/26/16</a:t>
+              <a:t>9/27/16</a:t>
             </a:fld>
             <a:endParaRPr lang="en-US"/>
           </a:p>
@@ -11100,7 +11100,7 @@
             <a:fld id="{446FEFB0-7A1A-44E6-B9DF-D284AB76E538}" type="datetimeFigureOut">
               <a:rPr lang="en-US" smtClean="0"/>
               <a:pPr/>
-              <a:t>9/26/16</a:t>
+              <a:t>9/27/16</a:t>
             </a:fld>
             <a:endParaRPr lang="en-US"/>
           </a:p>
@@ -11284,7 +11284,7 @@
             <a:fld id="{446FEFB0-7A1A-44E6-B9DF-D284AB76E538}" type="datetimeFigureOut">
               <a:rPr lang="en-US" smtClean="0"/>
               <a:pPr/>
-              <a:t>9/26/16</a:t>
+              <a:t>9/27/16</a:t>
             </a:fld>
             <a:endParaRPr lang="en-US"/>
           </a:p>
@@ -11468,7 +11468,7 @@
             <a:fld id="{446FEFB0-7A1A-44E6-B9DF-D284AB76E538}" type="datetimeFigureOut">
               <a:rPr lang="en-US" smtClean="0"/>
               <a:pPr/>
-              <a:t>9/26/16</a:t>
+              <a:t>9/27/16</a:t>
             </a:fld>
             <a:endParaRPr lang="en-US"/>
           </a:p>
@@ -11652,7 +11652,7 @@
             <a:fld id="{446FEFB0-7A1A-44E6-B9DF-D284AB76E538}" type="datetimeFigureOut">
               <a:rPr lang="en-US" smtClean="0"/>
               <a:pPr/>
-              <a:t>9/26/16</a:t>
+              <a:t>9/27/16</a:t>
             </a:fld>
             <a:endParaRPr lang="en-US"/>
           </a:p>
@@ -11836,7 +11836,7 @@
             <a:fld id="{446FEFB0-7A1A-44E6-B9DF-D284AB76E538}" type="datetimeFigureOut">
               <a:rPr lang="en-US" smtClean="0"/>
               <a:pPr/>
-              <a:t>9/26/16</a:t>
+              <a:t>9/27/16</a:t>
             </a:fld>
             <a:endParaRPr lang="en-US"/>
           </a:p>
@@ -12014,7 +12014,7 @@
           <a:p>
             <a:fld id="{62B18FAC-345F-B040-9DF7-375FB57F8B48}" type="datetimeFigureOut">
               <a:rPr lang="en-US" smtClean="0"/>
-              <a:t>9/26/16</a:t>
+              <a:t>9/27/16</a:t>
             </a:fld>
             <a:endParaRPr lang="en-US"/>
           </a:p>
@@ -12190,7 +12190,7 @@
             <a:fld id="{446FEFB0-7A1A-44E6-B9DF-D284AB76E538}" type="datetimeFigureOut">
               <a:rPr lang="en-US" smtClean="0"/>
               <a:pPr/>
-              <a:t>9/26/16</a:t>
+              <a:t>9/27/16</a:t>
             </a:fld>
             <a:endParaRPr lang="en-US"/>
           </a:p>
@@ -12374,7 +12374,7 @@
             <a:fld id="{446FEFB0-7A1A-44E6-B9DF-D284AB76E538}" type="datetimeFigureOut">
               <a:rPr lang="en-US" smtClean="0"/>
               <a:pPr/>
-              <a:t>9/26/16</a:t>
+              <a:t>9/27/16</a:t>
             </a:fld>
             <a:endParaRPr lang="en-US"/>
           </a:p>
@@ -12558,7 +12558,7 @@
             <a:fld id="{446FEFB0-7A1A-44E6-B9DF-D284AB76E538}" type="datetimeFigureOut">
               <a:rPr lang="en-US" smtClean="0"/>
               <a:pPr/>
-              <a:t>9/26/16</a:t>
+              <a:t>9/27/16</a:t>
             </a:fld>
             <a:endParaRPr lang="en-US"/>
           </a:p>
@@ -12742,7 +12742,7 @@
             <a:fld id="{446FEFB0-7A1A-44E6-B9DF-D284AB76E538}" type="datetimeFigureOut">
               <a:rPr lang="en-US" smtClean="0"/>
               <a:pPr/>
-              <a:t>9/26/16</a:t>
+              <a:t>9/27/16</a:t>
             </a:fld>
             <a:endParaRPr lang="en-US"/>
           </a:p>
@@ -12926,7 +12926,7 @@
             <a:fld id="{446FEFB0-7A1A-44E6-B9DF-D284AB76E538}" type="datetimeFigureOut">
               <a:rPr lang="en-US" smtClean="0"/>
               <a:pPr/>
-              <a:t>9/26/16</a:t>
+              <a:t>9/27/16</a:t>
             </a:fld>
             <a:endParaRPr lang="en-US"/>
           </a:p>
@@ -13110,7 +13110,7 @@
             <a:fld id="{446FEFB0-7A1A-44E6-B9DF-D284AB76E538}" type="datetimeFigureOut">
               <a:rPr lang="en-US" smtClean="0"/>
               <a:pPr/>
-              <a:t>9/26/16</a:t>
+              <a:t>9/27/16</a:t>
             </a:fld>
             <a:endParaRPr lang="en-US"/>
           </a:p>
@@ -13294,7 +13294,7 @@
             <a:fld id="{446FEFB0-7A1A-44E6-B9DF-D284AB76E538}" type="datetimeFigureOut">
               <a:rPr lang="en-US" smtClean="0"/>
               <a:pPr/>
-              <a:t>9/26/16</a:t>
+              <a:t>9/27/16</a:t>
             </a:fld>
             <a:endParaRPr lang="en-US"/>
           </a:p>
@@ -13478,7 +13478,7 @@
             <a:fld id="{446FEFB0-7A1A-44E6-B9DF-D284AB76E538}" type="datetimeFigureOut">
               <a:rPr lang="en-US" smtClean="0"/>
               <a:pPr/>
-              <a:t>9/26/16</a:t>
+              <a:t>9/27/16</a:t>
             </a:fld>
             <a:endParaRPr lang="en-US"/>
           </a:p>
@@ -13662,7 +13662,7 @@
             <a:fld id="{446FEFB0-7A1A-44E6-B9DF-D284AB76E538}" type="datetimeFigureOut">
               <a:rPr lang="en-US" smtClean="0"/>
               <a:pPr/>
-              <a:t>9/26/16</a:t>
+              <a:t>9/27/16</a:t>
             </a:fld>
             <a:endParaRPr lang="en-US"/>
           </a:p>
@@ -13846,7 +13846,7 @@
             <a:fld id="{446FEFB0-7A1A-44E6-B9DF-D284AB76E538}" type="datetimeFigureOut">
               <a:rPr lang="en-US" smtClean="0"/>
               <a:pPr/>
-              <a:t>9/26/16</a:t>
+              <a:t>9/27/16</a:t>
             </a:fld>
             <a:endParaRPr lang="en-US"/>
           </a:p>
@@ -14100,7 +14100,7 @@
           <a:p>
             <a:fld id="{62B18FAC-345F-B040-9DF7-375FB57F8B48}" type="datetimeFigureOut">
               <a:rPr lang="en-US" smtClean="0"/>
-              <a:t>9/26/16</a:t>
+              <a:t>9/27/16</a:t>
             </a:fld>
             <a:endParaRPr lang="en-US"/>
           </a:p>
@@ -14388,7 +14388,7 @@
           <a:p>
             <a:fld id="{62B18FAC-345F-B040-9DF7-375FB57F8B48}" type="datetimeFigureOut">
               <a:rPr lang="en-US" smtClean="0"/>
-              <a:t>9/26/16</a:t>
+              <a:t>9/27/16</a:t>
             </a:fld>
             <a:endParaRPr lang="en-US"/>
           </a:p>
@@ -14810,7 +14810,7 @@
           <a:p>
             <a:fld id="{62B18FAC-345F-B040-9DF7-375FB57F8B48}" type="datetimeFigureOut">
               <a:rPr lang="en-US" smtClean="0"/>
-              <a:t>9/26/16</a:t>
+              <a:t>9/27/16</a:t>
             </a:fld>
             <a:endParaRPr lang="en-US"/>
           </a:p>
@@ -14928,7 +14928,7 @@
           <a:p>
             <a:fld id="{62B18FAC-345F-B040-9DF7-375FB57F8B48}" type="datetimeFigureOut">
               <a:rPr lang="en-US" smtClean="0"/>
-              <a:t>9/26/16</a:t>
+              <a:t>9/27/16</a:t>
             </a:fld>
             <a:endParaRPr lang="en-US"/>
           </a:p>
@@ -15023,7 +15023,7 @@
           <a:p>
             <a:fld id="{62B18FAC-345F-B040-9DF7-375FB57F8B48}" type="datetimeFigureOut">
               <a:rPr lang="en-US" smtClean="0"/>
-              <a:t>9/26/16</a:t>
+              <a:t>9/27/16</a:t>
             </a:fld>
             <a:endParaRPr lang="en-US"/>
           </a:p>
@@ -15300,7 +15300,7 @@
           <a:p>
             <a:fld id="{62B18FAC-345F-B040-9DF7-375FB57F8B48}" type="datetimeFigureOut">
               <a:rPr lang="en-US" smtClean="0"/>
-              <a:t>9/26/16</a:t>
+              <a:t>9/27/16</a:t>
             </a:fld>
             <a:endParaRPr lang="en-US"/>
           </a:p>
@@ -15553,7 +15553,7 @@
           <a:p>
             <a:fld id="{62B18FAC-345F-B040-9DF7-375FB57F8B48}" type="datetimeFigureOut">
               <a:rPr lang="en-US" smtClean="0"/>
-              <a:t>9/26/16</a:t>
+              <a:t>9/27/16</a:t>
             </a:fld>
             <a:endParaRPr lang="en-US"/>
           </a:p>
@@ -15766,7 +15766,7 @@
           <a:p>
             <a:fld id="{62B18FAC-345F-B040-9DF7-375FB57F8B48}" type="datetimeFigureOut">
               <a:rPr lang="en-US" smtClean="0"/>
-              <a:t>9/26/16</a:t>
+              <a:t>9/27/16</a:t>
             </a:fld>
             <a:endParaRPr lang="en-US"/>
           </a:p>
@@ -16178,7 +16178,22 @@
           <a:p>
             <a:r>
               <a:rPr lang="en-US" dirty="0" smtClean="0"/>
-              <a:t>Stream and Block Ciphers</a:t>
+              <a:t>Symmetric </a:t>
+            </a:r>
+            <a:r>
+              <a:rPr lang="en-US" smtClean="0"/>
+              <a:t>Cryptography:</a:t>
+            </a:r>
+            <a:br>
+              <a:rPr lang="en-US" smtClean="0"/>
+            </a:br>
+            <a:r>
+              <a:rPr lang="en-US" smtClean="0"/>
+              <a:t>Stream </a:t>
+            </a:r>
+            <a:r>
+              <a:rPr lang="en-US" dirty="0" smtClean="0"/>
+              <a:t>and Block Ciphers</a:t>
             </a:r>
             <a:br>
               <a:rPr lang="en-US" dirty="0" smtClean="0"/>

</xml_diff>